<commit_message>
some changes to the presentation slide
</commit_message>
<xml_diff>
--- a/Final Presentation/DMC Final Artifacts Presentation Draft 2.pptx
+++ b/Final Presentation/DMC Final Artifacts Presentation Draft 2.pptx
@@ -18,7 +18,8 @@
     <p:sldId id="269" r:id="rId12"/>
     <p:sldId id="270" r:id="rId13"/>
     <p:sldId id="260" r:id="rId14"/>
-    <p:sldId id="268" r:id="rId15"/>
+    <p:sldId id="271" r:id="rId15"/>
+    <p:sldId id="268" r:id="rId16"/>
   </p:sldIdLst>
   <p:sldSz cx="12192000" cy="6858000"/>
   <p:notesSz cx="6858000" cy="9144000"/>
@@ -274,7 +275,7 @@
           <a:p>
             <a:fld id="{BD22E097-C3B7-4B76-9EA9-9A95EDB4A784}" type="datetimeFigureOut">
               <a:rPr lang="en-GB" smtClean="0"/>
-              <a:t>27/03/2020</a:t>
+              <a:t>10/04/2020</a:t>
             </a:fld>
             <a:endParaRPr lang="en-GB"/>
           </a:p>
@@ -474,7 +475,7 @@
           <a:p>
             <a:fld id="{BD22E097-C3B7-4B76-9EA9-9A95EDB4A784}" type="datetimeFigureOut">
               <a:rPr lang="en-GB" smtClean="0"/>
-              <a:t>27/03/2020</a:t>
+              <a:t>10/04/2020</a:t>
             </a:fld>
             <a:endParaRPr lang="en-GB"/>
           </a:p>
@@ -684,7 +685,7 @@
           <a:p>
             <a:fld id="{BD22E097-C3B7-4B76-9EA9-9A95EDB4A784}" type="datetimeFigureOut">
               <a:rPr lang="en-GB" smtClean="0"/>
-              <a:t>27/03/2020</a:t>
+              <a:t>10/04/2020</a:t>
             </a:fld>
             <a:endParaRPr lang="en-GB"/>
           </a:p>
@@ -884,7 +885,7 @@
           <a:p>
             <a:fld id="{BD22E097-C3B7-4B76-9EA9-9A95EDB4A784}" type="datetimeFigureOut">
               <a:rPr lang="en-GB" smtClean="0"/>
-              <a:t>27/03/2020</a:t>
+              <a:t>10/04/2020</a:t>
             </a:fld>
             <a:endParaRPr lang="en-GB"/>
           </a:p>
@@ -1160,7 +1161,7 @@
           <a:p>
             <a:fld id="{BD22E097-C3B7-4B76-9EA9-9A95EDB4A784}" type="datetimeFigureOut">
               <a:rPr lang="en-GB" smtClean="0"/>
-              <a:t>27/03/2020</a:t>
+              <a:t>10/04/2020</a:t>
             </a:fld>
             <a:endParaRPr lang="en-GB"/>
           </a:p>
@@ -1428,7 +1429,7 @@
           <a:p>
             <a:fld id="{BD22E097-C3B7-4B76-9EA9-9A95EDB4A784}" type="datetimeFigureOut">
               <a:rPr lang="en-GB" smtClean="0"/>
-              <a:t>27/03/2020</a:t>
+              <a:t>10/04/2020</a:t>
             </a:fld>
             <a:endParaRPr lang="en-GB"/>
           </a:p>
@@ -1843,7 +1844,7 @@
           <a:p>
             <a:fld id="{BD22E097-C3B7-4B76-9EA9-9A95EDB4A784}" type="datetimeFigureOut">
               <a:rPr lang="en-GB" smtClean="0"/>
-              <a:t>27/03/2020</a:t>
+              <a:t>10/04/2020</a:t>
             </a:fld>
             <a:endParaRPr lang="en-GB"/>
           </a:p>
@@ -1985,7 +1986,7 @@
           <a:p>
             <a:fld id="{BD22E097-C3B7-4B76-9EA9-9A95EDB4A784}" type="datetimeFigureOut">
               <a:rPr lang="en-GB" smtClean="0"/>
-              <a:t>27/03/2020</a:t>
+              <a:t>10/04/2020</a:t>
             </a:fld>
             <a:endParaRPr lang="en-GB"/>
           </a:p>
@@ -2098,7 +2099,7 @@
           <a:p>
             <a:fld id="{BD22E097-C3B7-4B76-9EA9-9A95EDB4A784}" type="datetimeFigureOut">
               <a:rPr lang="en-GB" smtClean="0"/>
-              <a:t>27/03/2020</a:t>
+              <a:t>10/04/2020</a:t>
             </a:fld>
             <a:endParaRPr lang="en-GB"/>
           </a:p>
@@ -2411,7 +2412,7 @@
           <a:p>
             <a:fld id="{BD22E097-C3B7-4B76-9EA9-9A95EDB4A784}" type="datetimeFigureOut">
               <a:rPr lang="en-GB" smtClean="0"/>
-              <a:t>27/03/2020</a:t>
+              <a:t>10/04/2020</a:t>
             </a:fld>
             <a:endParaRPr lang="en-GB"/>
           </a:p>
@@ -2700,7 +2701,7 @@
           <a:p>
             <a:fld id="{BD22E097-C3B7-4B76-9EA9-9A95EDB4A784}" type="datetimeFigureOut">
               <a:rPr lang="en-GB" smtClean="0"/>
-              <a:t>27/03/2020</a:t>
+              <a:t>10/04/2020</a:t>
             </a:fld>
             <a:endParaRPr lang="en-GB"/>
           </a:p>
@@ -2943,7 +2944,7 @@
           <a:p>
             <a:fld id="{BD22E097-C3B7-4B76-9EA9-9A95EDB4A784}" type="datetimeFigureOut">
               <a:rPr lang="en-GB" smtClean="0"/>
-              <a:t>27/03/2020</a:t>
+              <a:t>10/04/2020</a:t>
             </a:fld>
             <a:endParaRPr lang="en-GB"/>
           </a:p>
@@ -3742,7 +3743,7 @@
           <a:p>
             <a:r>
               <a:rPr lang="en-GB" dirty="0"/>
-              <a:t>Conclusion </a:t>
+              <a:t>Post mortem  </a:t>
             </a:r>
           </a:p>
         </p:txBody>
@@ -3836,6 +3837,89 @@
 </file>
 
 <file path=ppt/slides/slide14.xml><?xml version="1.0" encoding="utf-8"?>
+<p:sld xmlns:a="http://schemas.openxmlformats.org/drawingml/2006/main" xmlns:r="http://schemas.openxmlformats.org/officeDocument/2006/relationships" xmlns:p="http://schemas.openxmlformats.org/presentationml/2006/main">
+  <p:cSld>
+    <p:spTree>
+      <p:nvGrpSpPr>
+        <p:cNvPr id="1" name=""/>
+        <p:cNvGrpSpPr/>
+        <p:nvPr/>
+      </p:nvGrpSpPr>
+      <p:grpSpPr>
+        <a:xfrm>
+          <a:off x="0" y="0"/>
+          <a:ext cx="0" cy="0"/>
+          <a:chOff x="0" y="0"/>
+          <a:chExt cx="0" cy="0"/>
+        </a:xfrm>
+      </p:grpSpPr>
+      <p:sp>
+        <p:nvSpPr>
+          <p:cNvPr id="2" name="Title 1">
+            <a:extLst>
+              <a:ext uri="{FF2B5EF4-FFF2-40B4-BE49-F238E27FC236}">
+                <a16:creationId xmlns:a16="http://schemas.microsoft.com/office/drawing/2014/main" id="{C9E26BD0-FC15-4B08-B222-CA2B40972A0D}"/>
+              </a:ext>
+            </a:extLst>
+          </p:cNvPr>
+          <p:cNvSpPr>
+            <a:spLocks noGrp="1"/>
+          </p:cNvSpPr>
+          <p:nvPr>
+            <p:ph type="title"/>
+          </p:nvPr>
+        </p:nvSpPr>
+        <p:spPr/>
+        <p:txBody>
+          <a:bodyPr/>
+          <a:lstStyle/>
+          <a:p>
+            <a:r>
+              <a:rPr lang="en-GB" dirty="0"/>
+              <a:t>Problems faced </a:t>
+            </a:r>
+          </a:p>
+        </p:txBody>
+      </p:sp>
+      <p:sp>
+        <p:nvSpPr>
+          <p:cNvPr id="3" name="Content Placeholder 2">
+            <a:extLst>
+              <a:ext uri="{FF2B5EF4-FFF2-40B4-BE49-F238E27FC236}">
+                <a16:creationId xmlns:a16="http://schemas.microsoft.com/office/drawing/2014/main" id="{356182B0-46C1-4208-8C5E-0845884594A7}"/>
+              </a:ext>
+            </a:extLst>
+          </p:cNvPr>
+          <p:cNvSpPr>
+            <a:spLocks noGrp="1"/>
+          </p:cNvSpPr>
+          <p:nvPr>
+            <p:ph idx="1"/>
+          </p:nvPr>
+        </p:nvSpPr>
+        <p:spPr/>
+        <p:txBody>
+          <a:bodyPr/>
+          <a:lstStyle/>
+          <a:p>
+            <a:endParaRPr lang="en-GB"/>
+          </a:p>
+        </p:txBody>
+      </p:sp>
+    </p:spTree>
+    <p:extLst>
+      <p:ext uri="{BB962C8B-B14F-4D97-AF65-F5344CB8AC3E}">
+        <p14:creationId xmlns:p14="http://schemas.microsoft.com/office/powerpoint/2010/main" val="1501817532"/>
+      </p:ext>
+    </p:extLst>
+  </p:cSld>
+  <p:clrMapOvr>
+    <a:masterClrMapping/>
+  </p:clrMapOvr>
+</p:sld>
+</file>
+
+<file path=ppt/slides/slide15.xml><?xml version="1.0" encoding="utf-8"?>
 <p:sld xmlns:a="http://schemas.openxmlformats.org/drawingml/2006/main" xmlns:r="http://schemas.openxmlformats.org/officeDocument/2006/relationships" xmlns:p="http://schemas.openxmlformats.org/presentationml/2006/main">
   <p:cSld>
     <p:spTree>

</xml_diff>